<commit_message>
Update - noun freq
</commit_message>
<xml_diff>
--- a/paper_presentation.pptx
+++ b/paper_presentation.pptx
@@ -139,7 +139,7 @@
 <file path=ppt/revisionInfo.xml><?xml version="1.0" encoding="utf-8"?>
 <p1510:revInfo xmlns:a="http://schemas.openxmlformats.org/drawingml/2006/main" xmlns:r="http://schemas.openxmlformats.org/officeDocument/2006/relationships" xmlns:p1510="http://schemas.microsoft.com/office/powerpoint/2015/10/main">
   <p1510:revLst>
-    <p1510:client id="{8133341F-6290-7B4E-9016-ECA25BBD24D6}" v="1571" dt="2025-06-22T14:30:53.469"/>
+    <p1510:client id="{8133341F-6290-7B4E-9016-ECA25BBD24D6}" v="1588" dt="2025-07-06T14:25:49.501"/>
   </p1510:revLst>
 </p1510:revInfo>
 </file>
@@ -149,7 +149,7 @@
   <pc:docChgLst>
     <pc:chgData name="Netanel Shalev" userId="9b1bf0c7-f5a5-4008-84b1-60774bebe1d6" providerId="ADAL" clId="{8133341F-6290-7B4E-9016-ECA25BBD24D6}"/>
     <pc:docChg chg="undo redo custSel addSld delSld modSld sldOrd">
-      <pc:chgData name="Netanel Shalev" userId="9b1bf0c7-f5a5-4008-84b1-60774bebe1d6" providerId="ADAL" clId="{8133341F-6290-7B4E-9016-ECA25BBD24D6}" dt="2025-06-22T14:31:31.852" v="2343" actId="20577"/>
+      <pc:chgData name="Netanel Shalev" userId="9b1bf0c7-f5a5-4008-84b1-60774bebe1d6" providerId="ADAL" clId="{8133341F-6290-7B4E-9016-ECA25BBD24D6}" dt="2025-07-06T14:30:04.176" v="2426" actId="20577"/>
       <pc:docMkLst>
         <pc:docMk/>
       </pc:docMkLst>
@@ -921,14 +921,6 @@
             <ac:spMk id="3" creationId="{942997A5-7027-5DB5-69D7-A6F9B596142F}"/>
           </ac:spMkLst>
         </pc:spChg>
-        <pc:picChg chg="add del mod">
-          <ac:chgData name="Netanel Shalev" userId="9b1bf0c7-f5a5-4008-84b1-60774bebe1d6" providerId="ADAL" clId="{8133341F-6290-7B4E-9016-ECA25BBD24D6}" dt="2025-06-22T13:48:40.653" v="1784" actId="478"/>
-          <ac:picMkLst>
-            <pc:docMk/>
-            <pc:sldMk cId="223075621" sldId="278"/>
-            <ac:picMk id="4" creationId="{BDBDBCFD-E7F8-28C1-26B7-942B674B849F}"/>
-          </ac:picMkLst>
-        </pc:picChg>
       </pc:sldChg>
       <pc:sldChg chg="addSp delSp add del setBg delDesignElem">
         <pc:chgData name="Netanel Shalev" userId="9b1bf0c7-f5a5-4008-84b1-60774bebe1d6" providerId="ADAL" clId="{8133341F-6290-7B4E-9016-ECA25BBD24D6}" dt="2025-06-22T13:44:23.291" v="1733"/>
@@ -936,30 +928,6 @@
           <pc:docMk/>
           <pc:sldMk cId="2833144110" sldId="278"/>
         </pc:sldMkLst>
-        <pc:spChg chg="add del">
-          <ac:chgData name="Netanel Shalev" userId="9b1bf0c7-f5a5-4008-84b1-60774bebe1d6" providerId="ADAL" clId="{8133341F-6290-7B4E-9016-ECA25BBD24D6}" dt="2025-06-22T13:44:23.291" v="1733"/>
-          <ac:spMkLst>
-            <pc:docMk/>
-            <pc:sldMk cId="2833144110" sldId="278"/>
-            <ac:spMk id="8" creationId="{1A1B905F-E2B5-7259-DE69-F83CEA1C10F8}"/>
-          </ac:spMkLst>
-        </pc:spChg>
-        <pc:spChg chg="add del">
-          <ac:chgData name="Netanel Shalev" userId="9b1bf0c7-f5a5-4008-84b1-60774bebe1d6" providerId="ADAL" clId="{8133341F-6290-7B4E-9016-ECA25BBD24D6}" dt="2025-06-22T13:44:23.291" v="1733"/>
-          <ac:spMkLst>
-            <pc:docMk/>
-            <pc:sldMk cId="2833144110" sldId="278"/>
-            <ac:spMk id="10" creationId="{9A5C4B3B-2213-3DE5-2BD8-19EBA6236A73}"/>
-          </ac:spMkLst>
-        </pc:spChg>
-        <pc:spChg chg="add del">
-          <ac:chgData name="Netanel Shalev" userId="9b1bf0c7-f5a5-4008-84b1-60774bebe1d6" providerId="ADAL" clId="{8133341F-6290-7B4E-9016-ECA25BBD24D6}" dt="2025-06-22T13:44:23.291" v="1733"/>
-          <ac:spMkLst>
-            <pc:docMk/>
-            <pc:sldMk cId="2833144110" sldId="278"/>
-            <ac:spMk id="12" creationId="{BEF7EA58-0366-4F36-D5AC-88DDA00D957C}"/>
-          </ac:spMkLst>
-        </pc:spChg>
       </pc:sldChg>
       <pc:sldChg chg="new del">
         <pc:chgData name="Netanel Shalev" userId="9b1bf0c7-f5a5-4008-84b1-60774bebe1d6" providerId="ADAL" clId="{8133341F-6290-7B4E-9016-ECA25BBD24D6}" dt="2025-06-22T13:44:12.134" v="1730" actId="680"/>
@@ -969,7 +937,7 @@
         </pc:sldMkLst>
       </pc:sldChg>
       <pc:sldChg chg="addSp delSp modSp add mod">
-        <pc:chgData name="Netanel Shalev" userId="9b1bf0c7-f5a5-4008-84b1-60774bebe1d6" providerId="ADAL" clId="{8133341F-6290-7B4E-9016-ECA25BBD24D6}" dt="2025-06-22T14:23:59.066" v="2095" actId="20577"/>
+        <pc:chgData name="Netanel Shalev" userId="9b1bf0c7-f5a5-4008-84b1-60774bebe1d6" providerId="ADAL" clId="{8133341F-6290-7B4E-9016-ECA25BBD24D6}" dt="2025-07-06T14:25:57.812" v="2419" actId="14100"/>
         <pc:sldMkLst>
           <pc:docMk/>
           <pc:sldMk cId="1905198450" sldId="279"/>
@@ -982,24 +950,16 @@
             <ac:spMk id="2" creationId="{52B477B3-4BEA-B508-EEA2-1D183B86B929}"/>
           </ac:spMkLst>
         </pc:spChg>
-        <pc:spChg chg="del">
-          <ac:chgData name="Netanel Shalev" userId="9b1bf0c7-f5a5-4008-84b1-60774bebe1d6" providerId="ADAL" clId="{8133341F-6290-7B4E-9016-ECA25BBD24D6}" dt="2025-06-22T13:48:46.554" v="1786" actId="478"/>
-          <ac:spMkLst>
+        <pc:picChg chg="add mod">
+          <ac:chgData name="Netanel Shalev" userId="9b1bf0c7-f5a5-4008-84b1-60774bebe1d6" providerId="ADAL" clId="{8133341F-6290-7B4E-9016-ECA25BBD24D6}" dt="2025-07-06T14:25:57.812" v="2419" actId="14100"/>
+          <ac:picMkLst>
             <pc:docMk/>
             <pc:sldMk cId="1905198450" sldId="279"/>
-            <ac:spMk id="3" creationId="{364A35E5-E53E-FBF4-DF05-51FFFF8ADE6F}"/>
-          </ac:spMkLst>
-        </pc:spChg>
-        <pc:spChg chg="add del mod">
-          <ac:chgData name="Netanel Shalev" userId="9b1bf0c7-f5a5-4008-84b1-60774bebe1d6" providerId="ADAL" clId="{8133341F-6290-7B4E-9016-ECA25BBD24D6}" dt="2025-06-22T13:48:49.804" v="1788" actId="478"/>
-          <ac:spMkLst>
-            <pc:docMk/>
-            <pc:sldMk cId="1905198450" sldId="279"/>
-            <ac:spMk id="6" creationId="{74075264-CD54-BF70-FC89-E7542F3C78F3}"/>
-          </ac:spMkLst>
-        </pc:spChg>
-        <pc:picChg chg="mod">
-          <ac:chgData name="Netanel Shalev" userId="9b1bf0c7-f5a5-4008-84b1-60774bebe1d6" providerId="ADAL" clId="{8133341F-6290-7B4E-9016-ECA25BBD24D6}" dt="2025-06-22T13:49:12.713" v="1799" actId="1076"/>
+            <ac:picMk id="3" creationId="{FDC6F5BE-5717-1EA9-0707-AC35707E46BB}"/>
+          </ac:picMkLst>
+        </pc:picChg>
+        <pc:picChg chg="del mod">
+          <ac:chgData name="Netanel Shalev" userId="9b1bf0c7-f5a5-4008-84b1-60774bebe1d6" providerId="ADAL" clId="{8133341F-6290-7B4E-9016-ECA25BBD24D6}" dt="2025-07-06T14:23:48.360" v="2415" actId="478"/>
           <ac:picMkLst>
             <pc:docMk/>
             <pc:sldMk cId="1905198450" sldId="279"/>
@@ -1008,7 +968,7 @@
         </pc:picChg>
       </pc:sldChg>
       <pc:sldChg chg="addSp delSp modSp add mod">
-        <pc:chgData name="Netanel Shalev" userId="9b1bf0c7-f5a5-4008-84b1-60774bebe1d6" providerId="ADAL" clId="{8133341F-6290-7B4E-9016-ECA25BBD24D6}" dt="2025-06-22T14:06:41.997" v="1869" actId="14100"/>
+        <pc:chgData name="Netanel Shalev" userId="9b1bf0c7-f5a5-4008-84b1-60774bebe1d6" providerId="ADAL" clId="{8133341F-6290-7B4E-9016-ECA25BBD24D6}" dt="2025-07-06T14:09:52.868" v="2350" actId="1076"/>
         <pc:sldMkLst>
           <pc:docMk/>
           <pc:sldMk cId="261594163" sldId="280"/>
@@ -1019,30 +979,6 @@
             <pc:docMk/>
             <pc:sldMk cId="261594163" sldId="280"/>
             <ac:spMk id="2" creationId="{E2BB5889-28CF-F2EB-1029-06FAAE72819E}"/>
-          </ac:spMkLst>
-        </pc:spChg>
-        <pc:spChg chg="del">
-          <ac:chgData name="Netanel Shalev" userId="9b1bf0c7-f5a5-4008-84b1-60774bebe1d6" providerId="ADAL" clId="{8133341F-6290-7B4E-9016-ECA25BBD24D6}" dt="2025-06-22T14:04:34.472" v="1851" actId="26606"/>
-          <ac:spMkLst>
-            <pc:docMk/>
-            <pc:sldMk cId="261594163" sldId="280"/>
-            <ac:spMk id="8" creationId="{BB19595C-610A-895E-DB68-29A794F0B04C}"/>
-          </ac:spMkLst>
-        </pc:spChg>
-        <pc:spChg chg="del">
-          <ac:chgData name="Netanel Shalev" userId="9b1bf0c7-f5a5-4008-84b1-60774bebe1d6" providerId="ADAL" clId="{8133341F-6290-7B4E-9016-ECA25BBD24D6}" dt="2025-06-22T14:04:34.472" v="1851" actId="26606"/>
-          <ac:spMkLst>
-            <pc:docMk/>
-            <pc:sldMk cId="261594163" sldId="280"/>
-            <ac:spMk id="10" creationId="{E2BC83EF-DD86-2BB0-B595-6D82FC894C37}"/>
-          </ac:spMkLst>
-        </pc:spChg>
-        <pc:spChg chg="del">
-          <ac:chgData name="Netanel Shalev" userId="9b1bf0c7-f5a5-4008-84b1-60774bebe1d6" providerId="ADAL" clId="{8133341F-6290-7B4E-9016-ECA25BBD24D6}" dt="2025-06-22T14:04:34.472" v="1851" actId="26606"/>
-          <ac:spMkLst>
-            <pc:docMk/>
-            <pc:sldMk cId="261594163" sldId="280"/>
-            <ac:spMk id="12" creationId="{945B69CD-72F4-1ABB-AA15-F9037E88AD3D}"/>
           </ac:spMkLst>
         </pc:spChg>
         <pc:spChg chg="add">
@@ -1061,32 +997,16 @@
             <ac:spMk id="19" creationId="{CA677DB7-5829-45BD-9754-5EC484CC4253}"/>
           </ac:spMkLst>
         </pc:spChg>
-        <pc:picChg chg="add del mod">
-          <ac:chgData name="Netanel Shalev" userId="9b1bf0c7-f5a5-4008-84b1-60774bebe1d6" providerId="ADAL" clId="{8133341F-6290-7B4E-9016-ECA25BBD24D6}" dt="2025-06-22T14:05:02.092" v="1856" actId="478"/>
+        <pc:picChg chg="add mod">
+          <ac:chgData name="Netanel Shalev" userId="9b1bf0c7-f5a5-4008-84b1-60774bebe1d6" providerId="ADAL" clId="{8133341F-6290-7B4E-9016-ECA25BBD24D6}" dt="2025-07-06T14:09:52.868" v="2350" actId="1076"/>
           <ac:picMkLst>
             <pc:docMk/>
             <pc:sldMk cId="261594163" sldId="280"/>
-            <ac:picMk id="3" creationId="{8E506E02-DB4B-5A7F-66CF-227D81832BFA}"/>
-          </ac:picMkLst>
-        </pc:picChg>
-        <pc:picChg chg="del">
-          <ac:chgData name="Netanel Shalev" userId="9b1bf0c7-f5a5-4008-84b1-60774bebe1d6" providerId="ADAL" clId="{8133341F-6290-7B4E-9016-ECA25BBD24D6}" dt="2025-06-22T13:57:27.883" v="1847" actId="478"/>
-          <ac:picMkLst>
-            <pc:docMk/>
-            <pc:sldMk cId="261594163" sldId="280"/>
-            <ac:picMk id="4" creationId="{542785A8-6A25-DB06-5A0D-FF449617AECC}"/>
+            <ac:picMk id="3" creationId="{E683C9A1-A2DF-FE10-2427-76C4B011C38B}"/>
           </ac:picMkLst>
         </pc:picChg>
         <pc:picChg chg="add del mod">
-          <ac:chgData name="Netanel Shalev" userId="9b1bf0c7-f5a5-4008-84b1-60774bebe1d6" providerId="ADAL" clId="{8133341F-6290-7B4E-9016-ECA25BBD24D6}" dt="2025-06-22T14:06:15.990" v="1863" actId="478"/>
-          <ac:picMkLst>
-            <pc:docMk/>
-            <pc:sldMk cId="261594163" sldId="280"/>
-            <ac:picMk id="5" creationId="{3929D17B-0A0F-7C7D-558C-1FCD0D70E16D}"/>
-          </ac:picMkLst>
-        </pc:picChg>
-        <pc:picChg chg="add mod">
-          <ac:chgData name="Netanel Shalev" userId="9b1bf0c7-f5a5-4008-84b1-60774bebe1d6" providerId="ADAL" clId="{8133341F-6290-7B4E-9016-ECA25BBD24D6}" dt="2025-06-22T14:06:41.997" v="1869" actId="14100"/>
+          <ac:chgData name="Netanel Shalev" userId="9b1bf0c7-f5a5-4008-84b1-60774bebe1d6" providerId="ADAL" clId="{8133341F-6290-7B4E-9016-ECA25BBD24D6}" dt="2025-07-06T14:09:21.572" v="2344" actId="478"/>
           <ac:picMkLst>
             <pc:docMk/>
             <pc:sldMk cId="261594163" sldId="280"/>
@@ -1116,23 +1036,15 @@
             <ac:spMk id="3" creationId="{330F8D8F-3BDC-472B-DB5E-8FFC5F699B68}"/>
           </ac:spMkLst>
         </pc:spChg>
-        <pc:spChg chg="add del mod">
-          <ac:chgData name="Netanel Shalev" userId="9b1bf0c7-f5a5-4008-84b1-60774bebe1d6" providerId="ADAL" clId="{8133341F-6290-7B4E-9016-ECA25BBD24D6}" dt="2025-06-22T14:18:48.312" v="1905"/>
-          <ac:spMkLst>
-            <pc:docMk/>
-            <pc:sldMk cId="1436251023" sldId="281"/>
-            <ac:spMk id="4" creationId="{D42C62D8-8A21-37B0-FBE8-9329F13E6994}"/>
-          </ac:spMkLst>
-        </pc:spChg>
       </pc:sldChg>
       <pc:sldChg chg="modSp add mod">
-        <pc:chgData name="Netanel Shalev" userId="9b1bf0c7-f5a5-4008-84b1-60774bebe1d6" providerId="ADAL" clId="{8133341F-6290-7B4E-9016-ECA25BBD24D6}" dt="2025-06-22T14:23:43.540" v="2085" actId="15"/>
+        <pc:chgData name="Netanel Shalev" userId="9b1bf0c7-f5a5-4008-84b1-60774bebe1d6" providerId="ADAL" clId="{8133341F-6290-7B4E-9016-ECA25BBD24D6}" dt="2025-07-06T14:23:41.467" v="2414" actId="20577"/>
         <pc:sldMkLst>
           <pc:docMk/>
           <pc:sldMk cId="3150910265" sldId="282"/>
         </pc:sldMkLst>
         <pc:spChg chg="mod">
-          <ac:chgData name="Netanel Shalev" userId="9b1bf0c7-f5a5-4008-84b1-60774bebe1d6" providerId="ADAL" clId="{8133341F-6290-7B4E-9016-ECA25BBD24D6}" dt="2025-06-22T14:23:43.540" v="2085" actId="15"/>
+          <ac:chgData name="Netanel Shalev" userId="9b1bf0c7-f5a5-4008-84b1-60774bebe1d6" providerId="ADAL" clId="{8133341F-6290-7B4E-9016-ECA25BBD24D6}" dt="2025-07-06T14:23:41.467" v="2414" actId="20577"/>
           <ac:spMkLst>
             <pc:docMk/>
             <pc:sldMk cId="3150910265" sldId="282"/>
@@ -1141,7 +1053,7 @@
         </pc:spChg>
       </pc:sldChg>
       <pc:sldChg chg="modSp add mod">
-        <pc:chgData name="Netanel Shalev" userId="9b1bf0c7-f5a5-4008-84b1-60774bebe1d6" providerId="ADAL" clId="{8133341F-6290-7B4E-9016-ECA25BBD24D6}" dt="2025-06-22T14:31:31.852" v="2343" actId="20577"/>
+        <pc:chgData name="Netanel Shalev" userId="9b1bf0c7-f5a5-4008-84b1-60774bebe1d6" providerId="ADAL" clId="{8133341F-6290-7B4E-9016-ECA25BBD24D6}" dt="2025-07-06T14:30:04.176" v="2426" actId="20577"/>
         <pc:sldMkLst>
           <pc:docMk/>
           <pc:sldMk cId="828613008" sldId="283"/>
@@ -1155,7 +1067,7 @@
           </ac:spMkLst>
         </pc:spChg>
         <pc:spChg chg="mod">
-          <ac:chgData name="Netanel Shalev" userId="9b1bf0c7-f5a5-4008-84b1-60774bebe1d6" providerId="ADAL" clId="{8133341F-6290-7B4E-9016-ECA25BBD24D6}" dt="2025-06-22T14:31:31.852" v="2343" actId="20577"/>
+          <ac:chgData name="Netanel Shalev" userId="9b1bf0c7-f5a5-4008-84b1-60774bebe1d6" providerId="ADAL" clId="{8133341F-6290-7B4E-9016-ECA25BBD24D6}" dt="2025-07-06T14:30:04.176" v="2426" actId="20577"/>
           <ac:spMkLst>
             <pc:docMk/>
             <pc:sldMk cId="828613008" sldId="283"/>
@@ -1169,30 +1081,6 @@
           <pc:docMk/>
           <pc:sldMk cId="4132195655" sldId="283"/>
         </pc:sldMkLst>
-        <pc:spChg chg="add del">
-          <ac:chgData name="Netanel Shalev" userId="9b1bf0c7-f5a5-4008-84b1-60774bebe1d6" providerId="ADAL" clId="{8133341F-6290-7B4E-9016-ECA25BBD24D6}" dt="2025-06-22T14:24:22.386" v="2098"/>
-          <ac:spMkLst>
-            <pc:docMk/>
-            <pc:sldMk cId="4132195655" sldId="283"/>
-            <ac:spMk id="8" creationId="{2CB1D0ED-A48C-5E24-F0A6-509607EAA903}"/>
-          </ac:spMkLst>
-        </pc:spChg>
-        <pc:spChg chg="add del">
-          <ac:chgData name="Netanel Shalev" userId="9b1bf0c7-f5a5-4008-84b1-60774bebe1d6" providerId="ADAL" clId="{8133341F-6290-7B4E-9016-ECA25BBD24D6}" dt="2025-06-22T14:24:22.386" v="2098"/>
-          <ac:spMkLst>
-            <pc:docMk/>
-            <pc:sldMk cId="4132195655" sldId="283"/>
-            <ac:spMk id="10" creationId="{0FCB4812-3069-BB41-E133-1A486C805C84}"/>
-          </ac:spMkLst>
-        </pc:spChg>
-        <pc:spChg chg="add del">
-          <ac:chgData name="Netanel Shalev" userId="9b1bf0c7-f5a5-4008-84b1-60774bebe1d6" providerId="ADAL" clId="{8133341F-6290-7B4E-9016-ECA25BBD24D6}" dt="2025-06-22T14:24:22.386" v="2098"/>
-          <ac:spMkLst>
-            <pc:docMk/>
-            <pc:sldMk cId="4132195655" sldId="283"/>
-            <ac:spMk id="12" creationId="{BBD92DFB-20B7-A9CC-695A-2D87F687A854}"/>
-          </ac:spMkLst>
-        </pc:spChg>
       </pc:sldChg>
     </pc:docChg>
   </pc:docChgLst>
@@ -1609,7 +1497,7 @@
           <a:p>
             <a:fld id="{789357D1-E93F-0D43-9762-ABB9B3967190}" type="datetimeFigureOut">
               <a:rPr lang="he-IL" smtClean="0"/>
-              <a:t>כ"ו.סיון.תשפ"ה</a:t>
+              <a:t>י'.תמוז.תשפ"ה</a:t>
             </a:fld>
             <a:endParaRPr lang="he-IL"/>
           </a:p>
@@ -2732,7 +2620,7 @@
             <a:fld id="{900D4ED2-6730-A546-A3F7-FD709A31C73D}" type="datetime1">
               <a:rPr lang="en-US" smtClean="0"/>
               <a:pPr lvl="0"/>
-              <a:t>6/22/25</a:t>
+              <a:t>7/6/25</a:t>
             </a:fld>
             <a:endParaRPr lang="en-US"/>
           </a:p>
@@ -2906,7 +2794,7 @@
             <a:fld id="{900D4ED2-6730-A546-A3F7-FD709A31C73D}" type="datetime1">
               <a:rPr lang="en-US" smtClean="0"/>
               <a:pPr lvl="0"/>
-              <a:t>6/22/25</a:t>
+              <a:t>7/6/25</a:t>
             </a:fld>
             <a:endParaRPr lang="en-US"/>
           </a:p>
@@ -3090,7 +2978,7 @@
             <a:fld id="{900D4ED2-6730-A546-A3F7-FD709A31C73D}" type="datetime1">
               <a:rPr lang="en-US" smtClean="0"/>
               <a:pPr lvl="0"/>
-              <a:t>6/22/25</a:t>
+              <a:t>7/6/25</a:t>
             </a:fld>
             <a:endParaRPr lang="en-US"/>
           </a:p>
@@ -3264,7 +3152,7 @@
             <a:fld id="{900D4ED2-6730-A546-A3F7-FD709A31C73D}" type="datetime1">
               <a:rPr lang="en-US" smtClean="0"/>
               <a:pPr lvl="0"/>
-              <a:t>6/22/25</a:t>
+              <a:t>7/6/25</a:t>
             </a:fld>
             <a:endParaRPr lang="en-US"/>
           </a:p>
@@ -3536,7 +3424,7 @@
             <a:fld id="{900D4ED2-6730-A546-A3F7-FD709A31C73D}" type="datetime1">
               <a:rPr lang="en-US" smtClean="0"/>
               <a:pPr lvl="0"/>
-              <a:t>6/22/25</a:t>
+              <a:t>7/6/25</a:t>
             </a:fld>
             <a:endParaRPr lang="en-US"/>
           </a:p>
@@ -3772,7 +3660,7 @@
             <a:fld id="{900D4ED2-6730-A546-A3F7-FD709A31C73D}" type="datetime1">
               <a:rPr lang="en-US" smtClean="0"/>
               <a:pPr lvl="0"/>
-              <a:t>6/22/25</a:t>
+              <a:t>7/6/25</a:t>
             </a:fld>
             <a:endParaRPr lang="en-US"/>
           </a:p>
@@ -4135,7 +4023,7 @@
             <a:fld id="{900D4ED2-6730-A546-A3F7-FD709A31C73D}" type="datetime1">
               <a:rPr lang="en-US" smtClean="0"/>
               <a:pPr lvl="0"/>
-              <a:t>6/22/25</a:t>
+              <a:t>7/6/25</a:t>
             </a:fld>
             <a:endParaRPr lang="en-US"/>
           </a:p>
@@ -4280,7 +4168,7 @@
             <a:fld id="{900D4ED2-6730-A546-A3F7-FD709A31C73D}" type="datetime1">
               <a:rPr lang="en-US" smtClean="0"/>
               <a:pPr lvl="0"/>
-              <a:t>6/22/25</a:t>
+              <a:t>7/6/25</a:t>
             </a:fld>
             <a:endParaRPr lang="en-US"/>
           </a:p>
@@ -4379,7 +4267,7 @@
             <a:fld id="{900D4ED2-6730-A546-A3F7-FD709A31C73D}" type="datetime1">
               <a:rPr lang="en-US" smtClean="0"/>
               <a:pPr lvl="0"/>
-              <a:t>6/22/25</a:t>
+              <a:t>7/6/25</a:t>
             </a:fld>
             <a:endParaRPr lang="en-US"/>
           </a:p>
@@ -4740,7 +4628,7 @@
             <a:fld id="{900D4ED2-6730-A546-A3F7-FD709A31C73D}" type="datetime1">
               <a:rPr lang="en-US" smtClean="0"/>
               <a:pPr lvl="0"/>
-              <a:t>6/22/25</a:t>
+              <a:t>7/6/25</a:t>
             </a:fld>
             <a:endParaRPr lang="en-US"/>
           </a:p>
@@ -5101,7 +4989,7 @@
             <a:fld id="{900D4ED2-6730-A546-A3F7-FD709A31C73D}" type="datetime1">
               <a:rPr lang="en-US" smtClean="0"/>
               <a:pPr lvl="0"/>
-              <a:t>6/22/25</a:t>
+              <a:t>7/6/25</a:t>
             </a:fld>
             <a:endParaRPr lang="en-US"/>
           </a:p>
@@ -5347,7 +5235,7 @@
             <a:fld id="{900D4ED2-6730-A546-A3F7-FD709A31C73D}" type="datetime1">
               <a:rPr lang="en-US" smtClean="0"/>
               <a:pPr lvl="0"/>
-              <a:t>6/22/25</a:t>
+              <a:t>7/6/25</a:t>
             </a:fld>
             <a:endParaRPr lang="en-US"/>
           </a:p>
@@ -10157,7 +10045,7 @@
         </p:spPr>
         <p:txBody>
           <a:bodyPr vert="horz" lIns="91440" tIns="45720" rIns="91440" bIns="45720" rtlCol="0">
-            <a:normAutofit lnSpcReduction="10000"/>
+            <a:normAutofit fontScale="92500"/>
           </a:bodyPr>
           <a:lstStyle/>
           <a:p>
@@ -10170,13 +10058,16 @@
               </a:spcBef>
               <a:buNone/>
             </a:pPr>
-            <a:r>
-              <a:rPr lang="en-US" sz="1100" dirty="0">
+            <a:br>
+              <a:rPr lang="en" dirty="0"/>
+            </a:br>
+            <a:r>
+              <a:rPr lang="en" sz="1100" dirty="0">
                 <a:solidFill>
                   <a:srgbClr val="404040"/>
                 </a:solidFill>
               </a:rPr>
-              <a:t>Given the following persona, generate nine short personal stories told by the character at the following ages:</a:t>
+              <a:t>Given the following persona, generate 5 short personal stories told by the character at the following ages:</a:t>
             </a:r>
           </a:p>
           <a:p>
@@ -10190,12 +10081,12 @@
               <a:buNone/>
             </a:pPr>
             <a:r>
-              <a:rPr lang="en-US" sz="1100" dirty="0">
+              <a:rPr lang="en" sz="1100" dirty="0">
                 <a:solidFill>
                   <a:srgbClr val="404040"/>
                 </a:solidFill>
               </a:rPr>
-              <a:t>40, 45, 50, 55, 60, 65, 70, 75, and 80.</a:t>
+              <a:t>50 or the minimum between the figure’s current age, 60, 70, 80, and 90.</a:t>
             </a:r>
           </a:p>
           <a:p>
@@ -10214,7 +10105,7 @@
                   <a:srgbClr val="404040"/>
                 </a:solidFill>
               </a:rPr>
-              <a:t>_____________________________________________________________________________________________________________</a:t>
+              <a:t>___________________________________________________________________________________________________________________________</a:t>
             </a:r>
           </a:p>
           <a:p>
@@ -10228,7 +10119,7 @@
               <a:buNone/>
             </a:pPr>
             <a:r>
-              <a:rPr lang="en-US" sz="1100" dirty="0">
+              <a:rPr lang="en" sz="1100" dirty="0">
                 <a:solidFill>
                   <a:srgbClr val="404040"/>
                 </a:solidFill>
@@ -10247,12 +10138,50 @@
               <a:buNone/>
             </a:pPr>
             <a:r>
-              <a:rPr lang="en-US" sz="1100" dirty="0">
+              <a:rPr lang="en" sz="1100" dirty="0">
                 <a:solidFill>
                   <a:srgbClr val="404040"/>
                 </a:solidFill>
               </a:rPr>
               <a:t>That means:</a:t>
+            </a:r>
+          </a:p>
+          <a:p>
+            <a:pPr marL="0" indent="0" algn="l" rtl="0" fontAlgn="base">
+              <a:lnSpc>
+                <a:spcPct val="120000"/>
+              </a:lnSpc>
+              <a:spcBef>
+                <a:spcPts val="0"/>
+              </a:spcBef>
+              <a:buNone/>
+            </a:pPr>
+            <a:r>
+              <a:rPr lang="en" sz="1100" dirty="0">
+                <a:solidFill>
+                  <a:srgbClr val="404040"/>
+                </a:solidFill>
+              </a:rPr>
+              <a:t>The core event and setting should remain consistent across all five retellings.</a:t>
+            </a:r>
+          </a:p>
+          <a:p>
+            <a:pPr marL="0" indent="0" algn="l" rtl="0" fontAlgn="base">
+              <a:lnSpc>
+                <a:spcPct val="120000"/>
+              </a:lnSpc>
+              <a:spcBef>
+                <a:spcPts val="0"/>
+              </a:spcBef>
+              <a:buNone/>
+            </a:pPr>
+            <a:r>
+              <a:rPr lang="en" sz="1100" dirty="0">
+                <a:solidFill>
+                  <a:srgbClr val="404040"/>
+                </a:solidFill>
+              </a:rPr>
+              <a:t>However, how the story is told — what is remembered, how it’s framed emotionally, what details are emphasized, omitted, or altered — should change naturally with age.</a:t>
             </a:r>
           </a:p>
           <a:p>
@@ -10271,7 +10200,7 @@
                   <a:srgbClr val="404040"/>
                 </a:solidFill>
               </a:rPr>
-              <a:t>The core event and setting should remain consistent across all nine retellings.</a:t>
+              <a:t>___________________________________________________________________________________________________________________________</a:t>
             </a:r>
           </a:p>
           <a:p>
@@ -10285,12 +10214,107 @@
               <a:buNone/>
             </a:pPr>
             <a:r>
-              <a:rPr lang="en-US" sz="1100" dirty="0">
+              <a:rPr lang="en" sz="1200" dirty="0">
                 <a:solidFill>
                   <a:srgbClr val="404040"/>
                 </a:solidFill>
               </a:rPr>
-              <a:t>However, how the story is told — what is remembered, how it’s framed emotionally, what details are emphasized, omitted, or altered — should change naturally with age.</a:t>
+              <a:t>Each story should:</a:t>
+            </a:r>
+          </a:p>
+          <a:p>
+            <a:pPr marL="0" indent="0" algn="l" rtl="0" fontAlgn="base">
+              <a:lnSpc>
+                <a:spcPct val="120000"/>
+              </a:lnSpc>
+              <a:spcBef>
+                <a:spcPts val="0"/>
+              </a:spcBef>
+              <a:buNone/>
+            </a:pPr>
+            <a:r>
+              <a:rPr lang="en" sz="1200" dirty="0">
+                <a:solidFill>
+                  <a:srgbClr val="404040"/>
+                </a:solidFill>
+              </a:rPr>
+              <a:t>Be written in first person, as if the character is telling the memory aloud.</a:t>
+            </a:r>
+          </a:p>
+          <a:p>
+            <a:pPr marL="0" indent="0" algn="l" rtl="0" fontAlgn="base">
+              <a:lnSpc>
+                <a:spcPct val="120000"/>
+              </a:lnSpc>
+              <a:spcBef>
+                <a:spcPts val="0"/>
+              </a:spcBef>
+              <a:buNone/>
+            </a:pPr>
+            <a:r>
+              <a:rPr lang="en" sz="1200" dirty="0">
+                <a:solidFill>
+                  <a:srgbClr val="404040"/>
+                </a:solidFill>
+              </a:rPr>
+              <a:t>Be approximately 150 words in length.</a:t>
+            </a:r>
+          </a:p>
+          <a:p>
+            <a:pPr marL="0" indent="0" algn="l" rtl="0" fontAlgn="base">
+              <a:lnSpc>
+                <a:spcPct val="120000"/>
+              </a:lnSpc>
+              <a:spcBef>
+                <a:spcPts val="0"/>
+              </a:spcBef>
+              <a:buNone/>
+            </a:pPr>
+            <a:r>
+              <a:rPr lang="en" sz="1200" dirty="0">
+                <a:solidFill>
+                  <a:srgbClr val="404040"/>
+                </a:solidFill>
+              </a:rPr>
+              <a:t>Show the evolution of storytelling over time: through shifts in language, tone, clarity, emotional insight, or memory reliability.</a:t>
+            </a:r>
+          </a:p>
+          <a:p>
+            <a:pPr marL="0" indent="0" algn="l" rtl="0" fontAlgn="base">
+              <a:lnSpc>
+                <a:spcPct val="120000"/>
+              </a:lnSpc>
+              <a:spcBef>
+                <a:spcPts val="0"/>
+              </a:spcBef>
+              <a:buNone/>
+            </a:pPr>
+            <a:r>
+              <a:rPr lang="en" sz="1200" dirty="0">
+                <a:solidFill>
+                  <a:srgbClr val="404040"/>
+                </a:solidFill>
+              </a:rPr>
+              <a:t>Do not summarize or repeat text — each retelling should feel like a unique, authentic moment of personal reflection.</a:t>
+            </a:r>
+          </a:p>
+          <a:p>
+            <a:pPr marL="0" indent="0" algn="l" rtl="0" fontAlgn="base">
+              <a:lnSpc>
+                <a:spcPct val="120000"/>
+              </a:lnSpc>
+              <a:spcBef>
+                <a:spcPts val="0"/>
+              </a:spcBef>
+              <a:buNone/>
+            </a:pPr>
+            <a:r>
+              <a:rPr lang="en" sz="1200" dirty="0">
+                <a:solidFill>
+                  <a:srgbClr val="404040"/>
+                </a:solidFill>
+              </a:rPr>
+              <a:t>Do not mention or explain Alzheimer’s or any diagnosis explicitly.</a:t>
             </a:r>
           </a:p>
           <a:p>
@@ -10304,12 +10328,12 @@
               <a:buNone/>
             </a:pPr>
             <a:r>
-              <a:rPr lang="en-US" sz="1100" dirty="0">
+              <a:rPr lang="en-US" sz="1200" dirty="0">
                 <a:solidFill>
                   <a:srgbClr val="404040"/>
                 </a:solidFill>
               </a:rPr>
-              <a:t>_____________________________________________________________________________________________________________</a:t>
+              <a:t>________________________________________________________________________________________________________________</a:t>
             </a:r>
           </a:p>
           <a:p>
@@ -10323,12 +10347,12 @@
               <a:buNone/>
             </a:pPr>
             <a:r>
-              <a:rPr lang="en-US" sz="1100" dirty="0">
+              <a:rPr lang="en-US" sz="1200" dirty="0">
                 <a:solidFill>
                   <a:srgbClr val="404040"/>
                 </a:solidFill>
               </a:rPr>
-              <a:t>Each story should:</a:t>
+              <a:t>The character begins to experience Alzheimer’s disease at the age of X</a:t>
             </a:r>
           </a:p>
           <a:p>
@@ -10342,180 +10366,12 @@
               <a:buNone/>
             </a:pPr>
             <a:r>
-              <a:rPr lang="en-US" sz="1100" dirty="0">
+              <a:rPr lang="en-US" sz="1200" dirty="0">
                 <a:solidFill>
                   <a:srgbClr val="404040"/>
                 </a:solidFill>
               </a:rPr>
-              <a:t>Be written in first person, as if the character is telling the memory aloud.</a:t>
-            </a:r>
-          </a:p>
-          <a:p>
-            <a:pPr marL="0" indent="0" algn="l" rtl="0">
-              <a:lnSpc>
-                <a:spcPct val="120000"/>
-              </a:lnSpc>
-              <a:spcBef>
-                <a:spcPts val="0"/>
-              </a:spcBef>
-              <a:buNone/>
-            </a:pPr>
-            <a:r>
-              <a:rPr lang="en-US" sz="1100" dirty="0">
-                <a:solidFill>
-                  <a:srgbClr val="404040"/>
-                </a:solidFill>
-              </a:rPr>
-              <a:t>Be approximately 250 words in length.</a:t>
-            </a:r>
-          </a:p>
-          <a:p>
-            <a:pPr marL="0" indent="0" algn="l" rtl="0">
-              <a:lnSpc>
-                <a:spcPct val="120000"/>
-              </a:lnSpc>
-              <a:spcBef>
-                <a:spcPts val="0"/>
-              </a:spcBef>
-              <a:buNone/>
-            </a:pPr>
-            <a:r>
-              <a:rPr lang="en-US" sz="1100" dirty="0">
-                <a:solidFill>
-                  <a:srgbClr val="404040"/>
-                </a:solidFill>
-              </a:rPr>
-              <a:t>Show the evolution of storytelling over time: through shifts in language, tone, clarity, emotional insight, or memory reliability.</a:t>
-            </a:r>
-          </a:p>
-          <a:p>
-            <a:pPr marL="0" indent="0" algn="l" rtl="0">
-              <a:lnSpc>
-                <a:spcPct val="120000"/>
-              </a:lnSpc>
-              <a:spcBef>
-                <a:spcPts val="0"/>
-              </a:spcBef>
-              <a:buNone/>
-            </a:pPr>
-            <a:r>
-              <a:rPr lang="en-US" sz="1100" dirty="0">
-                <a:solidFill>
-                  <a:srgbClr val="404040"/>
-                </a:solidFill>
-              </a:rPr>
-              <a:t>Do not summarize or repeat text — each retelling should feel like a unique, authentic moment of personal reflection.</a:t>
-            </a:r>
-          </a:p>
-          <a:p>
-            <a:pPr marL="0" indent="0" algn="l" rtl="0">
-              <a:lnSpc>
-                <a:spcPct val="120000"/>
-              </a:lnSpc>
-              <a:spcBef>
-                <a:spcPts val="0"/>
-              </a:spcBef>
-              <a:buNone/>
-            </a:pPr>
-            <a:r>
-              <a:rPr lang="en-US" sz="1100" dirty="0">
-                <a:solidFill>
-                  <a:srgbClr val="404040"/>
-                </a:solidFill>
-              </a:rPr>
-              <a:t>Do not mention or explain Alzheimer’s or any diagnosis explicitly.</a:t>
-            </a:r>
-          </a:p>
-          <a:p>
-            <a:pPr marL="0" indent="0" algn="l" rtl="0">
-              <a:lnSpc>
-                <a:spcPct val="120000"/>
-              </a:lnSpc>
-              <a:spcBef>
-                <a:spcPts val="0"/>
-              </a:spcBef>
-              <a:buNone/>
-            </a:pPr>
-            <a:r>
-              <a:rPr lang="en-US" sz="1100" dirty="0">
-                <a:solidFill>
-                  <a:srgbClr val="404040"/>
-                </a:solidFill>
-              </a:rPr>
-              <a:t>_____________________________________________________________________________________________________________</a:t>
-            </a:r>
-          </a:p>
-          <a:p>
-            <a:pPr marL="0" indent="0" algn="l" rtl="0">
-              <a:lnSpc>
-                <a:spcPct val="120000"/>
-              </a:lnSpc>
-              <a:spcBef>
-                <a:spcPts val="0"/>
-              </a:spcBef>
-              <a:buNone/>
-            </a:pPr>
-            <a:endParaRPr lang="en-US" sz="1100" dirty="0">
-              <a:solidFill>
-                <a:srgbClr val="404040"/>
-              </a:solidFill>
-            </a:endParaRPr>
-          </a:p>
-          <a:p>
-            <a:pPr marL="0" indent="0" algn="l" rtl="0">
-              <a:lnSpc>
-                <a:spcPct val="120000"/>
-              </a:lnSpc>
-              <a:spcBef>
-                <a:spcPts val="0"/>
-              </a:spcBef>
-              <a:buNone/>
-            </a:pPr>
-            <a:r>
-              <a:rPr lang="en-US" sz="1100" dirty="0">
-                <a:solidFill>
-                  <a:srgbClr val="404040"/>
-                </a:solidFill>
-              </a:rPr>
-              <a:t>At some point in his later years (you may decide when), the character begins to experience Alzheimer’s disease.</a:t>
-            </a:r>
-          </a:p>
-          <a:p>
-            <a:pPr marL="0" indent="0" algn="l" rtl="0">
-              <a:lnSpc>
-                <a:spcPct val="120000"/>
-              </a:lnSpc>
-              <a:spcBef>
-                <a:spcPts val="0"/>
-              </a:spcBef>
-              <a:buNone/>
-            </a:pPr>
-            <a:r>
-              <a:rPr lang="en-US" sz="1100" dirty="0">
-                <a:solidFill>
-                  <a:srgbClr val="404040"/>
-                </a:solidFill>
-              </a:rPr>
-              <a:t>Let this be reflected — subtly and naturally — in the storytelling itself: perhaps through inconsistencies, repetition, emotional drift, or fragmented recall.</a:t>
-            </a:r>
-          </a:p>
-          <a:p>
-            <a:pPr marL="0" indent="0" algn="l" rtl="0">
-              <a:lnSpc>
-                <a:spcPct val="120000"/>
-              </a:lnSpc>
-              <a:spcBef>
-                <a:spcPts val="0"/>
-              </a:spcBef>
-              <a:buNone/>
-            </a:pPr>
-            <a:r>
-              <a:rPr lang="en-US" sz="1100" dirty="0">
-                <a:solidFill>
-                  <a:srgbClr val="404040"/>
-                </a:solidFill>
-              </a:rPr>
-              <a:t>You are free to decide how and when these changes appear based on your understanding of the condition.</a:t>
+              <a:t>Let this be reflected — subtly and naturally — in the storytelling itself: You are free to decide how and when these changes appear based on your understanding of the condition. Give your answer in JSON. </a:t>
             </a:r>
           </a:p>
         </p:txBody>
@@ -11776,10 +11632,10 @@
       </p:sp>
       <p:pic>
         <p:nvPicPr>
-          <p:cNvPr id="4" name="תמונה 3">
+          <p:cNvPr id="3" name="תמונה 2">
             <a:extLst>
               <a:ext uri="{FF2B5EF4-FFF2-40B4-BE49-F238E27FC236}">
-                <a16:creationId xmlns:a16="http://schemas.microsoft.com/office/drawing/2014/main" id="{A3EB8EF7-74F8-1EC8-AFD4-4C264D9D7F91}"/>
+                <a16:creationId xmlns:a16="http://schemas.microsoft.com/office/drawing/2014/main" id="{FDC6F5BE-5717-1EA9-0707-AC35707E46BB}"/>
               </a:ext>
             </a:extLst>
           </p:cNvPr>
@@ -11796,8 +11652,8 @@
         </p:blipFill>
         <p:spPr>
           <a:xfrm>
-            <a:off x="2183704" y="1285002"/>
-            <a:ext cx="7777160" cy="4287996"/>
+            <a:off x="1347426" y="1308016"/>
+            <a:ext cx="9493264" cy="3421430"/>
           </a:xfrm>
           <a:prstGeom prst="rect">
             <a:avLst/>
@@ -12009,10 +11865,10 @@
       </p:sp>
       <p:pic>
         <p:nvPicPr>
-          <p:cNvPr id="6" name="תמונה 5">
+          <p:cNvPr id="3" name="תמונה 2">
             <a:extLst>
               <a:ext uri="{FF2B5EF4-FFF2-40B4-BE49-F238E27FC236}">
-                <a16:creationId xmlns:a16="http://schemas.microsoft.com/office/drawing/2014/main" id="{3B5BC6ED-ABAD-4184-D3C6-2BCD9C3C17AC}"/>
+                <a16:creationId xmlns:a16="http://schemas.microsoft.com/office/drawing/2014/main" id="{E683C9A1-A2DF-FE10-2427-76C4B011C38B}"/>
               </a:ext>
             </a:extLst>
           </p:cNvPr>
@@ -12029,8 +11885,8 @@
         </p:blipFill>
         <p:spPr>
           <a:xfrm>
-            <a:off x="4654293" y="358992"/>
-            <a:ext cx="7540084" cy="6079386"/>
+            <a:off x="4705442" y="455667"/>
+            <a:ext cx="7435412" cy="5946666"/>
           </a:xfrm>
           <a:prstGeom prst="rect">
             <a:avLst/>
@@ -12421,7 +12277,7 @@
         </p:spPr>
         <p:txBody>
           <a:bodyPr vert="horz" lIns="91440" tIns="45720" rIns="91440" bIns="45720" rtlCol="0">
-            <a:normAutofit fontScale="85000" lnSpcReduction="10000"/>
+            <a:normAutofit/>
           </a:bodyPr>
           <a:lstStyle/>
           <a:p>
@@ -12436,100 +12292,12 @@
             <a:pPr algn="l" rtl="0"/>
             <a:r>
               <a:rPr lang="en" b="1" dirty="0"/>
-              <a:t>Story consistency</a:t>
+              <a:t>Next step</a:t>
             </a:r>
             <a:r>
               <a:rPr lang="en" dirty="0"/>
-              <a:t> – Do we want each version to be the exact same narrative retold, or is a shared theme or setting (e.g., “trip to Greece”) sufficient?</a:t>
-            </a:r>
-          </a:p>
-          <a:p>
-            <a:pPr algn="l" rtl="0"/>
-            <a:r>
-              <a:rPr lang="en" b="1" dirty="0"/>
-              <a:t>Control condition</a:t>
-            </a:r>
-            <a:r>
-              <a:rPr lang="en" dirty="0"/>
-              <a:t> – The paper compares matched pairs (healthy vs. diagnosed). Should we mirror this within one persona—Mike before and after cognitive decline or HC group similar to the paper?</a:t>
-            </a:r>
-          </a:p>
-          <a:p>
-            <a:pPr algn="l" rtl="0"/>
-            <a:r>
-              <a:rPr lang="en" b="1" dirty="0"/>
-              <a:t>Rate of decline</a:t>
-            </a:r>
-            <a:r>
-              <a:rPr lang="en" dirty="0"/>
-              <a:t> – The current output shows a sharp drop-off. How much should we guide the pace and features of decline, versus letting the model decide?</a:t>
-            </a:r>
-          </a:p>
-          <a:p>
-            <a:pPr algn="l" rtl="0"/>
-            <a:r>
-              <a:rPr lang="en" b="1" dirty="0"/>
-              <a:t>Number of stories</a:t>
-            </a:r>
-            <a:r>
-              <a:rPr lang="en" dirty="0"/>
-              <a:t> – We now produce nine stories (ages 40–80, five-year intervals). Is that manageable, or should we trim the timeline to ease analysis?</a:t>
-            </a:r>
-          </a:p>
-          <a:p>
-            <a:pPr algn="l" rtl="0"/>
-            <a:r>
-              <a:rPr lang="en" b="1" dirty="0"/>
-              <a:t>Metric alignment</a:t>
-            </a:r>
-            <a:r>
-              <a:rPr lang="en" dirty="0"/>
-              <a:t> – After running our code, most metrics mirrored the original paper’s results, but the </a:t>
-            </a:r>
-            <a:r>
-              <a:rPr lang="en" i="1" dirty="0" err="1"/>
-              <a:t>subtl</a:t>
-            </a:r>
-            <a:r>
-              <a:rPr lang="en" i="1" dirty="0"/>
-              <a:t>,</a:t>
-            </a:r>
-            <a:r>
-              <a:rPr lang="en" dirty="0"/>
-              <a:t> </a:t>
-            </a:r>
-            <a:r>
-              <a:rPr lang="en" dirty="0" err="1"/>
-              <a:t>zipf</a:t>
-            </a:r>
-            <a:r>
-              <a:rPr lang="en" dirty="0"/>
-              <a:t> and brunet measures did not match. Chicken and egg – characters vs pace decline.</a:t>
-            </a:r>
-          </a:p>
-          <a:p>
-            <a:pPr algn="l" rtl="0"/>
-            <a:r>
-              <a:rPr lang="en" b="1" dirty="0"/>
-              <a:t>Next step</a:t>
-            </a:r>
-            <a:r>
-              <a:rPr lang="en" dirty="0"/>
-              <a:t> – Refine code</a:t>
-            </a:r>
-            <a:r>
-              <a:rPr lang="en"/>
-              <a:t>/Prompt </a:t>
-            </a:r>
-            <a:r>
-              <a:rPr lang="en" dirty="0"/>
-              <a:t>and repeat metric evaluation to </a:t>
-            </a:r>
-            <a:r>
-              <a:rPr lang="en"/>
-              <a:t>achieve better results.</a:t>
-            </a:r>
-            <a:endParaRPr lang="en" dirty="0"/>
+              <a:t> – Refine code/Prompt and repeat metric evaluation to achieve better results.</a:t>
+            </a:r>
           </a:p>
         </p:txBody>
       </p:sp>

</xml_diff>